<commit_message>
[Updated] Middle Project Report updated
</commit_message>
<xml_diff>
--- a/doc/02_중간보고/AlphaOmok.pptx
+++ b/doc/02_중간보고/AlphaOmok.pptx
@@ -6,10 +6,10 @@
   </p:sldMasterIdLst>
   <p:sldIdLst>
     <p:sldId id="256" r:id="rId2"/>
-    <p:sldId id="261" r:id="rId3"/>
-    <p:sldId id="262" r:id="rId4"/>
-    <p:sldId id="263" r:id="rId5"/>
-    <p:sldId id="259" r:id="rId6"/>
+    <p:sldId id="262" r:id="rId3"/>
+    <p:sldId id="263" r:id="rId4"/>
+    <p:sldId id="259" r:id="rId5"/>
+    <p:sldId id="261" r:id="rId6"/>
     <p:sldId id="260" r:id="rId7"/>
     <p:sldId id="264" r:id="rId8"/>
     <p:sldId id="265" r:id="rId9"/>
@@ -279,7 +279,7 @@
           <a:p>
             <a:fld id="{1CF406D9-FA24-CF41-8560-5A11AC724858}" type="datetimeFigureOut">
               <a:rPr kumimoji="1" lang="ko-KR" altLang="en-US" smtClean="0"/>
-              <a:t>2018. 5. 24.</a:t>
+              <a:t>2018-05-24</a:t>
             </a:fld>
             <a:endParaRPr kumimoji="1" lang="ko-KR" altLang="en-US"/>
           </a:p>
@@ -477,7 +477,7 @@
           <a:p>
             <a:fld id="{1CF406D9-FA24-CF41-8560-5A11AC724858}" type="datetimeFigureOut">
               <a:rPr kumimoji="1" lang="ko-KR" altLang="en-US" smtClean="0"/>
-              <a:t>2018. 5. 24.</a:t>
+              <a:t>2018-05-24</a:t>
             </a:fld>
             <a:endParaRPr kumimoji="1" lang="ko-KR" altLang="en-US"/>
           </a:p>
@@ -685,7 +685,7 @@
           <a:p>
             <a:fld id="{1CF406D9-FA24-CF41-8560-5A11AC724858}" type="datetimeFigureOut">
               <a:rPr kumimoji="1" lang="ko-KR" altLang="en-US" smtClean="0"/>
-              <a:t>2018. 5. 24.</a:t>
+              <a:t>2018-05-24</a:t>
             </a:fld>
             <a:endParaRPr kumimoji="1" lang="ko-KR" altLang="en-US"/>
           </a:p>
@@ -883,7 +883,7 @@
           <a:p>
             <a:fld id="{1CF406D9-FA24-CF41-8560-5A11AC724858}" type="datetimeFigureOut">
               <a:rPr kumimoji="1" lang="ko-KR" altLang="en-US" smtClean="0"/>
-              <a:t>2018. 5. 24.</a:t>
+              <a:t>2018-05-24</a:t>
             </a:fld>
             <a:endParaRPr kumimoji="1" lang="ko-KR" altLang="en-US"/>
           </a:p>
@@ -1158,7 +1158,7 @@
           <a:p>
             <a:fld id="{1CF406D9-FA24-CF41-8560-5A11AC724858}" type="datetimeFigureOut">
               <a:rPr kumimoji="1" lang="ko-KR" altLang="en-US" smtClean="0"/>
-              <a:t>2018. 5. 24.</a:t>
+              <a:t>2018-05-24</a:t>
             </a:fld>
             <a:endParaRPr kumimoji="1" lang="ko-KR" altLang="en-US"/>
           </a:p>
@@ -1423,7 +1423,7 @@
           <a:p>
             <a:fld id="{1CF406D9-FA24-CF41-8560-5A11AC724858}" type="datetimeFigureOut">
               <a:rPr kumimoji="1" lang="ko-KR" altLang="en-US" smtClean="0"/>
-              <a:t>2018. 5. 24.</a:t>
+              <a:t>2018-05-24</a:t>
             </a:fld>
             <a:endParaRPr kumimoji="1" lang="ko-KR" altLang="en-US"/>
           </a:p>
@@ -1835,7 +1835,7 @@
           <a:p>
             <a:fld id="{1CF406D9-FA24-CF41-8560-5A11AC724858}" type="datetimeFigureOut">
               <a:rPr kumimoji="1" lang="ko-KR" altLang="en-US" smtClean="0"/>
-              <a:t>2018. 5. 24.</a:t>
+              <a:t>2018-05-24</a:t>
             </a:fld>
             <a:endParaRPr kumimoji="1" lang="ko-KR" altLang="en-US"/>
           </a:p>
@@ -1976,7 +1976,7 @@
           <a:p>
             <a:fld id="{1CF406D9-FA24-CF41-8560-5A11AC724858}" type="datetimeFigureOut">
               <a:rPr kumimoji="1" lang="ko-KR" altLang="en-US" smtClean="0"/>
-              <a:t>2018. 5. 24.</a:t>
+              <a:t>2018-05-24</a:t>
             </a:fld>
             <a:endParaRPr kumimoji="1" lang="ko-KR" altLang="en-US"/>
           </a:p>
@@ -2089,7 +2089,7 @@
           <a:p>
             <a:fld id="{1CF406D9-FA24-CF41-8560-5A11AC724858}" type="datetimeFigureOut">
               <a:rPr kumimoji="1" lang="ko-KR" altLang="en-US" smtClean="0"/>
-              <a:t>2018. 5. 24.</a:t>
+              <a:t>2018-05-24</a:t>
             </a:fld>
             <a:endParaRPr kumimoji="1" lang="ko-KR" altLang="en-US"/>
           </a:p>
@@ -2400,7 +2400,7 @@
           <a:p>
             <a:fld id="{1CF406D9-FA24-CF41-8560-5A11AC724858}" type="datetimeFigureOut">
               <a:rPr kumimoji="1" lang="ko-KR" altLang="en-US" smtClean="0"/>
-              <a:t>2018. 5. 24.</a:t>
+              <a:t>2018-05-24</a:t>
             </a:fld>
             <a:endParaRPr kumimoji="1" lang="ko-KR" altLang="en-US"/>
           </a:p>
@@ -2688,7 +2688,7 @@
           <a:p>
             <a:fld id="{1CF406D9-FA24-CF41-8560-5A11AC724858}" type="datetimeFigureOut">
               <a:rPr kumimoji="1" lang="ko-KR" altLang="en-US" smtClean="0"/>
-              <a:t>2018. 5. 24.</a:t>
+              <a:t>2018-05-24</a:t>
             </a:fld>
             <a:endParaRPr kumimoji="1" lang="ko-KR" altLang="en-US"/>
           </a:p>
@@ -2929,7 +2929,7 @@
           <a:p>
             <a:fld id="{1CF406D9-FA24-CF41-8560-5A11AC724858}" type="datetimeFigureOut">
               <a:rPr kumimoji="1" lang="ko-KR" altLang="en-US" smtClean="0"/>
-              <a:t>2018. 5. 24.</a:t>
+              <a:t>2018-05-24</a:t>
             </a:fld>
             <a:endParaRPr kumimoji="1" lang="ko-KR" altLang="en-US"/>
           </a:p>
@@ -3629,250 +3629,245 @@
           <a:p>
             <a:r>
               <a:rPr kumimoji="1" lang="ko-KR" altLang="en-US" sz="3200" dirty="0"/>
-              <a:t>게임 룰</a:t>
-            </a:r>
-            <a:r>
-              <a:rPr kumimoji="1" lang="en-US" altLang="ko-KR" sz="3200" dirty="0"/>
-              <a:t>(</a:t>
-            </a:r>
-            <a:r>
-              <a:rPr kumimoji="1" lang="ko-KR" altLang="en-US" sz="3200" dirty="0" err="1"/>
-              <a:t>렌주</a:t>
-            </a:r>
-            <a:r>
-              <a:rPr kumimoji="1" lang="ko-KR" altLang="en-US" sz="3200" dirty="0"/>
-              <a:t> 룰</a:t>
-            </a:r>
-            <a:r>
-              <a:rPr kumimoji="1" lang="en-US" altLang="ko-KR" sz="3200" dirty="0"/>
-              <a:t>)</a:t>
-            </a:r>
-          </a:p>
-        </p:txBody>
-      </p:sp>
-      <p:sp>
-        <p:nvSpPr>
-          <p:cNvPr id="3" name="TextBox 2">
-            <a:extLst>
-              <a:ext uri="{FF2B5EF4-FFF2-40B4-BE49-F238E27FC236}">
-                <a16:creationId xmlns:a16="http://schemas.microsoft.com/office/drawing/2014/main" id="{66EA1D7E-0736-4149-9031-797398277D4D}"/>
-              </a:ext>
-            </a:extLst>
-          </p:cNvPr>
-          <p:cNvSpPr txBox="1"/>
+              <a:t>개발 진행</a:t>
+            </a:r>
+            <a:endParaRPr kumimoji="1" lang="en-US" altLang="ko-KR" sz="3200" dirty="0"/>
+          </a:p>
+        </p:txBody>
+      </p:sp>
+      <p:cxnSp>
+        <p:nvCxnSpPr>
+          <p:cNvPr id="9" name="직선 화살표 연결선 8">
+            <a:extLst>
+              <a:ext uri="{FF2B5EF4-FFF2-40B4-BE49-F238E27FC236}">
+                <a16:creationId xmlns:a16="http://schemas.microsoft.com/office/drawing/2014/main" id="{CF3DB5BC-34BE-C14F-9866-845E5D47B3E6}"/>
+              </a:ext>
+            </a:extLst>
+          </p:cNvPr>
+          <p:cNvCxnSpPr>
+            <a:cxnSpLocks/>
+          </p:cNvCxnSpPr>
           <p:nvPr/>
-        </p:nvSpPr>
-        <p:spPr>
-          <a:xfrm>
-            <a:off x="468350" y="1602432"/>
-            <a:ext cx="5307981" cy="461665"/>
-          </a:xfrm>
-          <a:prstGeom prst="rect">
+        </p:nvCxnSpPr>
+        <p:spPr>
+          <a:xfrm>
+            <a:off x="3456879" y="3428999"/>
+            <a:ext cx="892097" cy="1"/>
+          </a:xfrm>
+          <a:prstGeom prst="straightConnector1">
             <a:avLst/>
           </a:prstGeom>
-          <a:noFill/>
-        </p:spPr>
-        <p:txBody>
-          <a:bodyPr wrap="square" rtlCol="0">
-            <a:spAutoFit/>
-          </a:bodyPr>
-          <a:lstStyle/>
-          <a:p>
-            <a:r>
-              <a:rPr kumimoji="1" lang="ko-KR" altLang="en-US" sz="2400" dirty="0"/>
-              <a:t>흑은 첫 수를 </a:t>
-            </a:r>
-            <a:r>
-              <a:rPr kumimoji="1" lang="ko-KR" altLang="en-US" sz="2400" b="1" dirty="0">
-                <a:solidFill>
-                  <a:srgbClr val="FF0000"/>
-                </a:solidFill>
-              </a:rPr>
-              <a:t>천원</a:t>
-            </a:r>
-            <a:r>
-              <a:rPr kumimoji="1" lang="ko-KR" altLang="en-US" sz="2400" dirty="0"/>
-              <a:t>에 둠</a:t>
-            </a:r>
-          </a:p>
-        </p:txBody>
-      </p:sp>
-      <p:sp>
-        <p:nvSpPr>
-          <p:cNvPr id="4" name="TextBox 3">
-            <a:extLst>
-              <a:ext uri="{FF2B5EF4-FFF2-40B4-BE49-F238E27FC236}">
-                <a16:creationId xmlns:a16="http://schemas.microsoft.com/office/drawing/2014/main" id="{5F4F3280-FABD-5B46-9DA0-AF10F4E4BD3A}"/>
-              </a:ext>
-            </a:extLst>
-          </p:cNvPr>
-          <p:cNvSpPr txBox="1"/>
+          <a:ln>
+            <a:tailEnd type="triangle"/>
+          </a:ln>
+        </p:spPr>
+        <p:style>
+          <a:lnRef idx="1">
+            <a:schemeClr val="accent1"/>
+          </a:lnRef>
+          <a:fillRef idx="0">
+            <a:schemeClr val="accent1"/>
+          </a:fillRef>
+          <a:effectRef idx="0">
+            <a:schemeClr val="accent1"/>
+          </a:effectRef>
+          <a:fontRef idx="minor">
+            <a:schemeClr val="tx1"/>
+          </a:fontRef>
+        </p:style>
+      </p:cxnSp>
+      <p:sp>
+        <p:nvSpPr>
+          <p:cNvPr id="11" name="타원 10">
+            <a:extLst>
+              <a:ext uri="{FF2B5EF4-FFF2-40B4-BE49-F238E27FC236}">
+                <a16:creationId xmlns:a16="http://schemas.microsoft.com/office/drawing/2014/main" id="{0CA8C352-D2AE-F149-8D56-61ED8CE0D595}"/>
+              </a:ext>
+            </a:extLst>
+          </p:cNvPr>
+          <p:cNvSpPr/>
           <p:nvPr/>
         </p:nvSpPr>
         <p:spPr>
           <a:xfrm>
-            <a:off x="468350" y="2357144"/>
-            <a:ext cx="5307981" cy="461665"/>
-          </a:xfrm>
-          <a:prstGeom prst="rect">
+            <a:off x="4819185" y="2202365"/>
+            <a:ext cx="2553629" cy="2453269"/>
+          </a:xfrm>
+          <a:prstGeom prst="ellipse">
             <a:avLst/>
           </a:prstGeom>
-          <a:noFill/>
-        </p:spPr>
-        <p:txBody>
-          <a:bodyPr wrap="square" rtlCol="0">
-            <a:spAutoFit/>
-          </a:bodyPr>
-          <a:lstStyle/>
-          <a:p>
-            <a:r>
-              <a:rPr kumimoji="1" lang="ko-KR" altLang="en-US" sz="2400" dirty="0"/>
-              <a:t>흑 </a:t>
-            </a:r>
-            <a:r>
-              <a:rPr kumimoji="1" lang="en-US" altLang="ko-KR" sz="2400" b="1" dirty="0">
-                <a:solidFill>
-                  <a:srgbClr val="FF0000"/>
-                </a:solidFill>
-              </a:rPr>
-              <a:t>3-3</a:t>
-            </a:r>
-            <a:r>
-              <a:rPr kumimoji="1" lang="en-US" altLang="ko-KR" sz="2400" dirty="0"/>
-              <a:t>,</a:t>
-            </a:r>
-            <a:r>
-              <a:rPr kumimoji="1" lang="ko-KR" altLang="en-US" sz="2400" dirty="0"/>
-              <a:t> </a:t>
-            </a:r>
-            <a:r>
-              <a:rPr kumimoji="1" lang="en-US" altLang="ko-KR" sz="2400" b="1" dirty="0">
-                <a:solidFill>
-                  <a:srgbClr val="FF0000"/>
-                </a:solidFill>
-              </a:rPr>
-              <a:t>4-4</a:t>
-            </a:r>
-            <a:r>
-              <a:rPr kumimoji="1" lang="en-US" altLang="ko-KR" sz="2400" dirty="0"/>
-              <a:t>,</a:t>
-            </a:r>
-            <a:r>
-              <a:rPr kumimoji="1" lang="ko-KR" altLang="en-US" sz="2400" dirty="0"/>
-              <a:t> </a:t>
-            </a:r>
-            <a:r>
-              <a:rPr kumimoji="1" lang="ko-KR" altLang="en-US" sz="2400" b="1" dirty="0" err="1">
-                <a:solidFill>
-                  <a:srgbClr val="FF0000"/>
-                </a:solidFill>
-              </a:rPr>
-              <a:t>육목</a:t>
-            </a:r>
-            <a:r>
-              <a:rPr kumimoji="1" lang="ko-KR" altLang="en-US" sz="2400" dirty="0"/>
-              <a:t> 금지</a:t>
-            </a:r>
-          </a:p>
-        </p:txBody>
-      </p:sp>
-      <p:sp>
-        <p:nvSpPr>
-          <p:cNvPr id="5" name="TextBox 4">
-            <a:extLst>
-              <a:ext uri="{FF2B5EF4-FFF2-40B4-BE49-F238E27FC236}">
-                <a16:creationId xmlns:a16="http://schemas.microsoft.com/office/drawing/2014/main" id="{61A07584-D2A0-8B4F-8ABE-491911469108}"/>
-              </a:ext>
-            </a:extLst>
-          </p:cNvPr>
-          <p:cNvSpPr txBox="1"/>
+        </p:spPr>
+        <p:style>
+          <a:lnRef idx="2">
+            <a:schemeClr val="accent1">
+              <a:shade val="50000"/>
+            </a:schemeClr>
+          </a:lnRef>
+          <a:fillRef idx="1">
+            <a:schemeClr val="accent1"/>
+          </a:fillRef>
+          <a:effectRef idx="0">
+            <a:schemeClr val="accent1"/>
+          </a:effectRef>
+          <a:fontRef idx="minor">
+            <a:schemeClr val="lt1"/>
+          </a:fontRef>
+        </p:style>
+        <p:txBody>
+          <a:bodyPr rtlCol="0" anchor="ctr"/>
+          <a:lstStyle/>
+          <a:p>
+            <a:pPr algn="ctr"/>
+            <a:r>
+              <a:rPr kumimoji="1" lang="ko-KR" altLang="en-US" sz="2000" b="1" dirty="0"/>
+              <a:t>클래스 설계</a:t>
+            </a:r>
+          </a:p>
+        </p:txBody>
+      </p:sp>
+      <p:cxnSp>
+        <p:nvCxnSpPr>
+          <p:cNvPr id="12" name="직선 화살표 연결선 11">
+            <a:extLst>
+              <a:ext uri="{FF2B5EF4-FFF2-40B4-BE49-F238E27FC236}">
+                <a16:creationId xmlns:a16="http://schemas.microsoft.com/office/drawing/2014/main" id="{F847DB90-9C35-F24B-8688-345D6C56A8C0}"/>
+              </a:ext>
+            </a:extLst>
+          </p:cNvPr>
+          <p:cNvCxnSpPr>
+            <a:cxnSpLocks/>
+          </p:cNvCxnSpPr>
           <p:nvPr/>
-        </p:nvSpPr>
-        <p:spPr>
-          <a:xfrm>
-            <a:off x="468350" y="3148880"/>
-            <a:ext cx="5307981" cy="461665"/>
-          </a:xfrm>
-          <a:prstGeom prst="rect">
+        </p:nvCxnSpPr>
+        <p:spPr>
+          <a:xfrm>
+            <a:off x="7843023" y="3429000"/>
+            <a:ext cx="892097" cy="1"/>
+          </a:xfrm>
+          <a:prstGeom prst="straightConnector1">
             <a:avLst/>
           </a:prstGeom>
-          <a:noFill/>
-        </p:spPr>
-        <p:txBody>
-          <a:bodyPr wrap="square" rtlCol="0">
-            <a:spAutoFit/>
-          </a:bodyPr>
-          <a:lstStyle/>
-          <a:p>
-            <a:r>
-              <a:rPr kumimoji="1" lang="ko-KR" altLang="en-US" sz="2400" dirty="0"/>
-              <a:t>일반적으로 </a:t>
-            </a:r>
-            <a:r>
-              <a:rPr kumimoji="1" lang="en-US" altLang="ko-KR" sz="2400" dirty="0"/>
-              <a:t>15x15 </a:t>
-            </a:r>
-            <a:r>
-              <a:rPr kumimoji="1" lang="ko-KR" altLang="en-US" sz="2400" dirty="0"/>
-              <a:t>오목판으로 사용</a:t>
-            </a:r>
-          </a:p>
-        </p:txBody>
-      </p:sp>
-      <p:sp>
-        <p:nvSpPr>
-          <p:cNvPr id="6" name="TextBox 5">
-            <a:extLst>
-              <a:ext uri="{FF2B5EF4-FFF2-40B4-BE49-F238E27FC236}">
-                <a16:creationId xmlns:a16="http://schemas.microsoft.com/office/drawing/2014/main" id="{DF1B6BBB-500B-7B49-90CF-BE720409EB87}"/>
-              </a:ext>
-            </a:extLst>
-          </p:cNvPr>
-          <p:cNvSpPr txBox="1"/>
+          <a:ln>
+            <a:tailEnd type="triangle"/>
+          </a:ln>
+        </p:spPr>
+        <p:style>
+          <a:lnRef idx="1">
+            <a:schemeClr val="accent1"/>
+          </a:lnRef>
+          <a:fillRef idx="0">
+            <a:schemeClr val="accent1"/>
+          </a:fillRef>
+          <a:effectRef idx="0">
+            <a:schemeClr val="accent1"/>
+          </a:effectRef>
+          <a:fontRef idx="minor">
+            <a:schemeClr val="tx1"/>
+          </a:fontRef>
+        </p:style>
+      </p:cxnSp>
+      <p:sp>
+        <p:nvSpPr>
+          <p:cNvPr id="13" name="타원 12">
+            <a:extLst>
+              <a:ext uri="{FF2B5EF4-FFF2-40B4-BE49-F238E27FC236}">
+                <a16:creationId xmlns:a16="http://schemas.microsoft.com/office/drawing/2014/main" id="{F47E7F22-B893-A940-9634-369CC439B095}"/>
+              </a:ext>
+            </a:extLst>
+          </p:cNvPr>
+          <p:cNvSpPr/>
           <p:nvPr/>
         </p:nvSpPr>
         <p:spPr>
           <a:xfrm>
-            <a:off x="468349" y="5442314"/>
-            <a:ext cx="7114480" cy="461665"/>
-          </a:xfrm>
-          <a:prstGeom prst="rect">
+            <a:off x="9205329" y="2202364"/>
+            <a:ext cx="2553629" cy="2453269"/>
+          </a:xfrm>
+          <a:prstGeom prst="ellipse">
             <a:avLst/>
           </a:prstGeom>
-          <a:noFill/>
-        </p:spPr>
-        <p:txBody>
-          <a:bodyPr wrap="square" rtlCol="0">
-            <a:spAutoFit/>
-          </a:bodyPr>
-          <a:lstStyle/>
-          <a:p>
-            <a:r>
-              <a:rPr kumimoji="1" lang="en" altLang="ko-KR" sz="2400" dirty="0">
-                <a:hlinkClick r:id="rId2"/>
-              </a:rPr>
-              <a:t>https://</a:t>
-            </a:r>
-            <a:r>
-              <a:rPr kumimoji="1" lang="en" altLang="ko-KR" sz="2400" dirty="0" err="1">
-                <a:hlinkClick r:id="rId2"/>
-              </a:rPr>
-              <a:t>namu.wiki</a:t>
-            </a:r>
-            <a:r>
-              <a:rPr kumimoji="1" lang="en" altLang="ko-KR" sz="2400" dirty="0">
-                <a:hlinkClick r:id="rId2"/>
-              </a:rPr>
-              <a:t>/w/%EB%A0%8C%EC%A3%BC</a:t>
-            </a:r>
-            <a:endParaRPr kumimoji="1" lang="ko-KR" altLang="en-US" sz="2400" dirty="0"/>
+        </p:spPr>
+        <p:style>
+          <a:lnRef idx="2">
+            <a:schemeClr val="accent1">
+              <a:shade val="50000"/>
+            </a:schemeClr>
+          </a:lnRef>
+          <a:fillRef idx="1">
+            <a:schemeClr val="accent1"/>
+          </a:fillRef>
+          <a:effectRef idx="0">
+            <a:schemeClr val="accent1"/>
+          </a:effectRef>
+          <a:fontRef idx="minor">
+            <a:schemeClr val="lt1"/>
+          </a:fontRef>
+        </p:style>
+        <p:txBody>
+          <a:bodyPr rtlCol="0" anchor="ctr"/>
+          <a:lstStyle/>
+          <a:p>
+            <a:pPr algn="ctr"/>
+            <a:r>
+              <a:rPr kumimoji="1" lang="ko-KR" altLang="en-US" sz="2000" b="1" dirty="0"/>
+              <a:t>개발 진행</a:t>
+            </a:r>
+          </a:p>
+        </p:txBody>
+      </p:sp>
+      <p:sp>
+        <p:nvSpPr>
+          <p:cNvPr id="19" name="타원 18">
+            <a:extLst>
+              <a:ext uri="{FF2B5EF4-FFF2-40B4-BE49-F238E27FC236}">
+                <a16:creationId xmlns:a16="http://schemas.microsoft.com/office/drawing/2014/main" id="{35AC867B-4539-5443-B529-E017F8B766EA}"/>
+              </a:ext>
+            </a:extLst>
+          </p:cNvPr>
+          <p:cNvSpPr/>
+          <p:nvPr/>
+        </p:nvSpPr>
+        <p:spPr>
+          <a:xfrm>
+            <a:off x="433041" y="2096430"/>
+            <a:ext cx="2553629" cy="2453269"/>
+          </a:xfrm>
+          <a:prstGeom prst="ellipse">
+            <a:avLst/>
+          </a:prstGeom>
+        </p:spPr>
+        <p:style>
+          <a:lnRef idx="2">
+            <a:schemeClr val="accent1">
+              <a:shade val="50000"/>
+            </a:schemeClr>
+          </a:lnRef>
+          <a:fillRef idx="1">
+            <a:schemeClr val="accent1"/>
+          </a:fillRef>
+          <a:effectRef idx="0">
+            <a:schemeClr val="accent1"/>
+          </a:effectRef>
+          <a:fontRef idx="minor">
+            <a:schemeClr val="lt1"/>
+          </a:fontRef>
+        </p:style>
+        <p:txBody>
+          <a:bodyPr rtlCol="0" anchor="ctr"/>
+          <a:lstStyle/>
+          <a:p>
+            <a:pPr algn="ctr"/>
+            <a:r>
+              <a:rPr kumimoji="1" lang="ko-KR" altLang="en-US" sz="2000" b="1" dirty="0"/>
+              <a:t>화면 설계</a:t>
+            </a:r>
           </a:p>
         </p:txBody>
       </p:sp>
     </p:spTree>
     <p:extLst>
       <p:ext uri="{BB962C8B-B14F-4D97-AF65-F5344CB8AC3E}">
-        <p14:creationId xmlns:p14="http://schemas.microsoft.com/office/powerpoint/2010/main" val="968293018"/>
+        <p14:creationId xmlns:p14="http://schemas.microsoft.com/office/powerpoint/2010/main" val="1723476303"/>
       </p:ext>
     </p:extLst>
   </p:cSld>
@@ -3929,245 +3924,321 @@
           <a:p>
             <a:r>
               <a:rPr kumimoji="1" lang="ko-KR" altLang="en-US" sz="3200" dirty="0"/>
-              <a:t>개발 진행</a:t>
+              <a:t>협업</a:t>
             </a:r>
             <a:endParaRPr kumimoji="1" lang="en-US" altLang="ko-KR" sz="3200" dirty="0"/>
           </a:p>
         </p:txBody>
       </p:sp>
-      <p:cxnSp>
-        <p:nvCxnSpPr>
-          <p:cNvPr id="9" name="직선 화살표 연결선 8">
-            <a:extLst>
-              <a:ext uri="{FF2B5EF4-FFF2-40B4-BE49-F238E27FC236}">
-                <a16:creationId xmlns:a16="http://schemas.microsoft.com/office/drawing/2014/main" id="{CF3DB5BC-34BE-C14F-9866-845E5D47B3E6}"/>
-              </a:ext>
-            </a:extLst>
-          </p:cNvPr>
-          <p:cNvCxnSpPr>
-            <a:cxnSpLocks/>
-          </p:cNvCxnSpPr>
+      <p:sp>
+        <p:nvSpPr>
+          <p:cNvPr id="4" name="TextBox 3">
+            <a:extLst>
+              <a:ext uri="{FF2B5EF4-FFF2-40B4-BE49-F238E27FC236}">
+                <a16:creationId xmlns:a16="http://schemas.microsoft.com/office/drawing/2014/main" id="{1425BE48-1769-1844-917D-8216C846A122}"/>
+              </a:ext>
+            </a:extLst>
+          </p:cNvPr>
+          <p:cNvSpPr txBox="1"/>
           <p:nvPr/>
-        </p:nvCxnSpPr>
-        <p:spPr>
-          <a:xfrm>
-            <a:off x="3456879" y="3428999"/>
-            <a:ext cx="892097" cy="1"/>
-          </a:xfrm>
-          <a:prstGeom prst="straightConnector1">
+        </p:nvSpPr>
+        <p:spPr>
+          <a:xfrm>
+            <a:off x="468351" y="1386988"/>
+            <a:ext cx="5307981" cy="461665"/>
+          </a:xfrm>
+          <a:prstGeom prst="rect">
             <a:avLst/>
           </a:prstGeom>
-          <a:ln>
-            <a:tailEnd type="triangle"/>
-          </a:ln>
-        </p:spPr>
-        <p:style>
-          <a:lnRef idx="1">
-            <a:schemeClr val="accent1"/>
-          </a:lnRef>
-          <a:fillRef idx="0">
-            <a:schemeClr val="accent1"/>
-          </a:fillRef>
-          <a:effectRef idx="0">
-            <a:schemeClr val="accent1"/>
-          </a:effectRef>
-          <a:fontRef idx="minor">
-            <a:schemeClr val="tx1"/>
-          </a:fontRef>
-        </p:style>
-      </p:cxnSp>
-      <p:sp>
-        <p:nvSpPr>
-          <p:cNvPr id="11" name="타원 10">
-            <a:extLst>
-              <a:ext uri="{FF2B5EF4-FFF2-40B4-BE49-F238E27FC236}">
-                <a16:creationId xmlns:a16="http://schemas.microsoft.com/office/drawing/2014/main" id="{0CA8C352-D2AE-F149-8D56-61ED8CE0D595}"/>
-              </a:ext>
-            </a:extLst>
-          </p:cNvPr>
-          <p:cNvSpPr/>
+          <a:noFill/>
+        </p:spPr>
+        <p:txBody>
+          <a:bodyPr wrap="square" rtlCol="0">
+            <a:spAutoFit/>
+          </a:bodyPr>
+          <a:lstStyle/>
+          <a:p>
+            <a:r>
+              <a:rPr kumimoji="1" lang="en-US" altLang="ko-KR" sz="2400" b="1" dirty="0">
+                <a:solidFill>
+                  <a:schemeClr val="accent1">
+                    <a:lumMod val="75000"/>
+                  </a:schemeClr>
+                </a:solidFill>
+              </a:rPr>
+              <a:t>Commit Message Guide</a:t>
+            </a:r>
+          </a:p>
+        </p:txBody>
+      </p:sp>
+      <p:sp>
+        <p:nvSpPr>
+          <p:cNvPr id="5" name="TextBox 4">
+            <a:extLst>
+              <a:ext uri="{FF2B5EF4-FFF2-40B4-BE49-F238E27FC236}">
+                <a16:creationId xmlns:a16="http://schemas.microsoft.com/office/drawing/2014/main" id="{5FE4E980-C894-5E44-BC67-B4CEFF65FBB1}"/>
+              </a:ext>
+            </a:extLst>
+          </p:cNvPr>
+          <p:cNvSpPr txBox="1"/>
           <p:nvPr/>
         </p:nvSpPr>
         <p:spPr>
           <a:xfrm>
-            <a:off x="4819185" y="2202365"/>
-            <a:ext cx="2553629" cy="2453269"/>
-          </a:xfrm>
-          <a:prstGeom prst="ellipse">
+            <a:off x="468351" y="2124309"/>
+            <a:ext cx="11273883" cy="461665"/>
+          </a:xfrm>
+          <a:prstGeom prst="rect">
             <a:avLst/>
           </a:prstGeom>
-        </p:spPr>
-        <p:style>
-          <a:lnRef idx="2">
-            <a:schemeClr val="accent1">
-              <a:shade val="50000"/>
-            </a:schemeClr>
-          </a:lnRef>
-          <a:fillRef idx="1">
-            <a:schemeClr val="accent1"/>
-          </a:fillRef>
-          <a:effectRef idx="0">
-            <a:schemeClr val="accent1"/>
-          </a:effectRef>
-          <a:fontRef idx="minor">
-            <a:schemeClr val="lt1"/>
-          </a:fontRef>
-        </p:style>
-        <p:txBody>
-          <a:bodyPr rtlCol="0" anchor="ctr"/>
-          <a:lstStyle/>
-          <a:p>
-            <a:pPr algn="ctr"/>
-            <a:r>
-              <a:rPr kumimoji="1" lang="ko-KR" altLang="en-US" sz="2000" b="1" dirty="0"/>
-              <a:t>클래스 설계</a:t>
-            </a:r>
-          </a:p>
-        </p:txBody>
-      </p:sp>
-      <p:cxnSp>
-        <p:nvCxnSpPr>
-          <p:cNvPr id="12" name="직선 화살표 연결선 11">
-            <a:extLst>
-              <a:ext uri="{FF2B5EF4-FFF2-40B4-BE49-F238E27FC236}">
-                <a16:creationId xmlns:a16="http://schemas.microsoft.com/office/drawing/2014/main" id="{F847DB90-9C35-F24B-8688-345D6C56A8C0}"/>
-              </a:ext>
-            </a:extLst>
-          </p:cNvPr>
-          <p:cNvCxnSpPr>
-            <a:cxnSpLocks/>
-          </p:cNvCxnSpPr>
+          <a:noFill/>
+        </p:spPr>
+        <p:txBody>
+          <a:bodyPr wrap="square" rtlCol="0">
+            <a:spAutoFit/>
+          </a:bodyPr>
+          <a:lstStyle/>
+          <a:p>
+            <a:r>
+              <a:rPr kumimoji="1" lang="en-US" altLang="ko-KR" sz="2400" dirty="0"/>
+              <a:t>[Updated] – </a:t>
+            </a:r>
+            <a:r>
+              <a:rPr kumimoji="1" lang="ko-KR" altLang="en-US" sz="2400" dirty="0"/>
+              <a:t>파일이나 기능이 수정되었을 경우</a:t>
+            </a:r>
+            <a:endParaRPr kumimoji="1" lang="en-US" altLang="ko-KR" sz="2400" dirty="0"/>
+          </a:p>
+        </p:txBody>
+      </p:sp>
+      <p:sp>
+        <p:nvSpPr>
+          <p:cNvPr id="6" name="TextBox 5">
+            <a:extLst>
+              <a:ext uri="{FF2B5EF4-FFF2-40B4-BE49-F238E27FC236}">
+                <a16:creationId xmlns:a16="http://schemas.microsoft.com/office/drawing/2014/main" id="{4FD67551-D4B2-4945-8A13-ED17E7AC36C4}"/>
+              </a:ext>
+            </a:extLst>
+          </p:cNvPr>
+          <p:cNvSpPr txBox="1"/>
           <p:nvPr/>
-        </p:nvCxnSpPr>
-        <p:spPr>
-          <a:xfrm>
-            <a:off x="7843023" y="3429000"/>
-            <a:ext cx="892097" cy="1"/>
-          </a:xfrm>
-          <a:prstGeom prst="straightConnector1">
+        </p:nvSpPr>
+        <p:spPr>
+          <a:xfrm>
+            <a:off x="468351" y="2861630"/>
+            <a:ext cx="11273883" cy="461665"/>
+          </a:xfrm>
+          <a:prstGeom prst="rect">
             <a:avLst/>
           </a:prstGeom>
-          <a:ln>
-            <a:tailEnd type="triangle"/>
-          </a:ln>
-        </p:spPr>
-        <p:style>
-          <a:lnRef idx="1">
-            <a:schemeClr val="accent1"/>
-          </a:lnRef>
-          <a:fillRef idx="0">
-            <a:schemeClr val="accent1"/>
-          </a:fillRef>
-          <a:effectRef idx="0">
-            <a:schemeClr val="accent1"/>
-          </a:effectRef>
-          <a:fontRef idx="minor">
-            <a:schemeClr val="tx1"/>
-          </a:fontRef>
-        </p:style>
-      </p:cxnSp>
-      <p:sp>
-        <p:nvSpPr>
-          <p:cNvPr id="13" name="타원 12">
-            <a:extLst>
-              <a:ext uri="{FF2B5EF4-FFF2-40B4-BE49-F238E27FC236}">
-                <a16:creationId xmlns:a16="http://schemas.microsoft.com/office/drawing/2014/main" id="{F47E7F22-B893-A940-9634-369CC439B095}"/>
-              </a:ext>
-            </a:extLst>
-          </p:cNvPr>
-          <p:cNvSpPr/>
+          <a:noFill/>
+        </p:spPr>
+        <p:txBody>
+          <a:bodyPr wrap="square" rtlCol="0">
+            <a:spAutoFit/>
+          </a:bodyPr>
+          <a:lstStyle/>
+          <a:p>
+            <a:r>
+              <a:rPr kumimoji="1" lang="en-US" altLang="ko-KR" sz="2400" dirty="0"/>
+              <a:t>[Add] – </a:t>
+            </a:r>
+            <a:r>
+              <a:rPr kumimoji="1" lang="ko-KR" altLang="en-US" sz="2400" dirty="0"/>
+              <a:t>파일이나 기능이 추가되었을 경우</a:t>
+            </a:r>
+            <a:endParaRPr kumimoji="1" lang="en-US" altLang="ko-KR" sz="2400" dirty="0"/>
+          </a:p>
+        </p:txBody>
+      </p:sp>
+      <p:sp>
+        <p:nvSpPr>
+          <p:cNvPr id="7" name="TextBox 6">
+            <a:extLst>
+              <a:ext uri="{FF2B5EF4-FFF2-40B4-BE49-F238E27FC236}">
+                <a16:creationId xmlns:a16="http://schemas.microsoft.com/office/drawing/2014/main" id="{57A1A272-B509-7843-9C15-74C0B239B637}"/>
+              </a:ext>
+            </a:extLst>
+          </p:cNvPr>
+          <p:cNvSpPr txBox="1"/>
           <p:nvPr/>
         </p:nvSpPr>
         <p:spPr>
           <a:xfrm>
-            <a:off x="9205329" y="2202364"/>
-            <a:ext cx="2553629" cy="2453269"/>
-          </a:xfrm>
-          <a:prstGeom prst="ellipse">
+            <a:off x="459058" y="3598951"/>
+            <a:ext cx="11273883" cy="461665"/>
+          </a:xfrm>
+          <a:prstGeom prst="rect">
             <a:avLst/>
           </a:prstGeom>
-        </p:spPr>
-        <p:style>
-          <a:lnRef idx="2">
-            <a:schemeClr val="accent1">
-              <a:shade val="50000"/>
-            </a:schemeClr>
-          </a:lnRef>
-          <a:fillRef idx="1">
-            <a:schemeClr val="accent1"/>
-          </a:fillRef>
-          <a:effectRef idx="0">
-            <a:schemeClr val="accent1"/>
-          </a:effectRef>
-          <a:fontRef idx="minor">
-            <a:schemeClr val="lt1"/>
-          </a:fontRef>
-        </p:style>
-        <p:txBody>
-          <a:bodyPr rtlCol="0" anchor="ctr"/>
-          <a:lstStyle/>
-          <a:p>
-            <a:pPr algn="ctr"/>
-            <a:r>
-              <a:rPr kumimoji="1" lang="ko-KR" altLang="en-US" sz="2000" b="1" dirty="0"/>
-              <a:t>개발 진행</a:t>
-            </a:r>
-          </a:p>
-        </p:txBody>
-      </p:sp>
-      <p:sp>
-        <p:nvSpPr>
-          <p:cNvPr id="19" name="타원 18">
-            <a:extLst>
-              <a:ext uri="{FF2B5EF4-FFF2-40B4-BE49-F238E27FC236}">
-                <a16:creationId xmlns:a16="http://schemas.microsoft.com/office/drawing/2014/main" id="{35AC867B-4539-5443-B529-E017F8B766EA}"/>
-              </a:ext>
-            </a:extLst>
-          </p:cNvPr>
-          <p:cNvSpPr/>
+          <a:noFill/>
+        </p:spPr>
+        <p:txBody>
+          <a:bodyPr wrap="square" rtlCol="0">
+            <a:spAutoFit/>
+          </a:bodyPr>
+          <a:lstStyle/>
+          <a:p>
+            <a:r>
+              <a:rPr kumimoji="1" lang="en-US" altLang="ko-KR" sz="2400" dirty="0"/>
+              <a:t>[Fixed] – </a:t>
+            </a:r>
+            <a:r>
+              <a:rPr kumimoji="1" lang="ko-KR" altLang="en-US" sz="2400" dirty="0"/>
+              <a:t>버그를 수정할 경우</a:t>
+            </a:r>
+            <a:endParaRPr kumimoji="1" lang="en-US" altLang="ko-KR" sz="2400" dirty="0"/>
+          </a:p>
+        </p:txBody>
+      </p:sp>
+      <p:sp>
+        <p:nvSpPr>
+          <p:cNvPr id="8" name="TextBox 7">
+            <a:extLst>
+              <a:ext uri="{FF2B5EF4-FFF2-40B4-BE49-F238E27FC236}">
+                <a16:creationId xmlns:a16="http://schemas.microsoft.com/office/drawing/2014/main" id="{5D05DC2E-C9BA-2348-BC1B-885E36B4A8F6}"/>
+              </a:ext>
+            </a:extLst>
+          </p:cNvPr>
+          <p:cNvSpPr txBox="1"/>
           <p:nvPr/>
         </p:nvSpPr>
         <p:spPr>
           <a:xfrm>
-            <a:off x="433041" y="2096430"/>
-            <a:ext cx="2553629" cy="2453269"/>
-          </a:xfrm>
-          <a:prstGeom prst="ellipse">
+            <a:off x="459057" y="4405629"/>
+            <a:ext cx="11273883" cy="461665"/>
+          </a:xfrm>
+          <a:prstGeom prst="rect">
             <a:avLst/>
           </a:prstGeom>
-        </p:spPr>
-        <p:style>
-          <a:lnRef idx="2">
-            <a:schemeClr val="accent1">
-              <a:shade val="50000"/>
-            </a:schemeClr>
-          </a:lnRef>
-          <a:fillRef idx="1">
-            <a:schemeClr val="accent1"/>
-          </a:fillRef>
-          <a:effectRef idx="0">
-            <a:schemeClr val="accent1"/>
-          </a:effectRef>
-          <a:fontRef idx="minor">
-            <a:schemeClr val="lt1"/>
-          </a:fontRef>
-        </p:style>
-        <p:txBody>
-          <a:bodyPr rtlCol="0" anchor="ctr"/>
-          <a:lstStyle/>
-          <a:p>
-            <a:pPr algn="ctr"/>
-            <a:r>
-              <a:rPr kumimoji="1" lang="ko-KR" altLang="en-US" sz="2000" b="1" dirty="0"/>
-              <a:t>화면 설계</a:t>
-            </a:r>
-          </a:p>
-        </p:txBody>
-      </p:sp>
+          <a:noFill/>
+        </p:spPr>
+        <p:txBody>
+          <a:bodyPr wrap="square" rtlCol="0">
+            <a:spAutoFit/>
+          </a:bodyPr>
+          <a:lstStyle/>
+          <a:p>
+            <a:r>
+              <a:rPr kumimoji="1" lang="en-US" altLang="ko-KR" sz="2400" b="1" dirty="0">
+                <a:solidFill>
+                  <a:schemeClr val="accent1">
+                    <a:lumMod val="75000"/>
+                  </a:schemeClr>
+                </a:solidFill>
+              </a:rPr>
+              <a:t>Etc..</a:t>
+            </a:r>
+          </a:p>
+        </p:txBody>
+      </p:sp>
+      <p:sp>
+        <p:nvSpPr>
+          <p:cNvPr id="9" name="TextBox 8">
+            <a:extLst>
+              <a:ext uri="{FF2B5EF4-FFF2-40B4-BE49-F238E27FC236}">
+                <a16:creationId xmlns:a16="http://schemas.microsoft.com/office/drawing/2014/main" id="{871C6028-CB96-3340-A5AB-8E5A3EC0E937}"/>
+              </a:ext>
+            </a:extLst>
+          </p:cNvPr>
+          <p:cNvSpPr txBox="1"/>
+          <p:nvPr/>
+        </p:nvSpPr>
+        <p:spPr>
+          <a:xfrm>
+            <a:off x="468351" y="5142950"/>
+            <a:ext cx="11273883" cy="830997"/>
+          </a:xfrm>
+          <a:prstGeom prst="rect">
+            <a:avLst/>
+          </a:prstGeom>
+          <a:noFill/>
+        </p:spPr>
+        <p:txBody>
+          <a:bodyPr wrap="square" rtlCol="0">
+            <a:spAutoFit/>
+          </a:bodyPr>
+          <a:lstStyle/>
+          <a:p>
+            <a:r>
+              <a:rPr kumimoji="1" lang="ko-KR" altLang="en-US" sz="2400" dirty="0"/>
+              <a:t>특정 이슈와 관련된 </a:t>
+            </a:r>
+            <a:r>
+              <a:rPr kumimoji="1" lang="ko-KR" altLang="en-US" sz="2400" dirty="0" err="1"/>
+              <a:t>커밋</a:t>
+            </a:r>
+            <a:r>
+              <a:rPr kumimoji="1" lang="ko-KR" altLang="en-US" sz="2400" dirty="0"/>
+              <a:t> </a:t>
+            </a:r>
+            <a:r>
+              <a:rPr kumimoji="1" lang="en-US" altLang="ko-KR" sz="2400" dirty="0"/>
+              <a:t>(#</a:t>
+            </a:r>
+            <a:r>
+              <a:rPr kumimoji="1" lang="ko-KR" altLang="en-US" sz="2400" dirty="0" err="1"/>
+              <a:t>이슈번호</a:t>
+            </a:r>
+            <a:r>
+              <a:rPr kumimoji="1" lang="en-US" altLang="ko-KR" sz="2400" dirty="0"/>
+              <a:t>)</a:t>
+            </a:r>
+          </a:p>
+          <a:p>
+            <a:r>
+              <a:rPr kumimoji="1" lang="ko-KR" altLang="en-US" sz="2400" dirty="0"/>
+              <a:t>이슈를 닫을 경우 </a:t>
+            </a:r>
+            <a:r>
+              <a:rPr kumimoji="1" lang="en-US" altLang="ko-KR" sz="2400" dirty="0"/>
+              <a:t>(closed #</a:t>
+            </a:r>
+            <a:r>
+              <a:rPr kumimoji="1" lang="ko-KR" altLang="en-US" sz="2400" dirty="0" err="1"/>
+              <a:t>이슈번호</a:t>
+            </a:r>
+            <a:r>
+              <a:rPr kumimoji="1" lang="en-US" altLang="ko-KR" sz="2400" dirty="0"/>
+              <a:t>)</a:t>
+            </a:r>
+          </a:p>
+        </p:txBody>
+      </p:sp>
+      <p:pic>
+        <p:nvPicPr>
+          <p:cNvPr id="10" name="그림 9">
+            <a:extLst>
+              <a:ext uri="{FF2B5EF4-FFF2-40B4-BE49-F238E27FC236}">
+                <a16:creationId xmlns:a16="http://schemas.microsoft.com/office/drawing/2014/main" id="{D6EE10CC-C83D-6840-9EFF-556C41C151CC}"/>
+              </a:ext>
+            </a:extLst>
+          </p:cNvPr>
+          <p:cNvPicPr>
+            <a:picLocks noChangeAspect="1"/>
+          </p:cNvPicPr>
+          <p:nvPr/>
+        </p:nvPicPr>
+        <p:blipFill>
+          <a:blip r:embed="rId2"/>
+          <a:stretch>
+            <a:fillRect/>
+          </a:stretch>
+        </p:blipFill>
+        <p:spPr>
+          <a:xfrm>
+            <a:off x="7022477" y="718524"/>
+            <a:ext cx="5037556" cy="5760854"/>
+          </a:xfrm>
+          <a:prstGeom prst="rect">
+            <a:avLst/>
+          </a:prstGeom>
+        </p:spPr>
+      </p:pic>
     </p:spTree>
     <p:extLst>
       <p:ext uri="{BB962C8B-B14F-4D97-AF65-F5344CB8AC3E}">
-        <p14:creationId xmlns:p14="http://schemas.microsoft.com/office/powerpoint/2010/main" val="1723476303"/>
+        <p14:creationId xmlns:p14="http://schemas.microsoft.com/office/powerpoint/2010/main" val="3514008146"/>
       </p:ext>
     </p:extLst>
   </p:cSld>
@@ -4224,293 +4295,18 @@
           <a:p>
             <a:r>
               <a:rPr kumimoji="1" lang="ko-KR" altLang="en-US" sz="3200" dirty="0"/>
-              <a:t>협업</a:t>
+              <a:t>현재 진행상황</a:t>
             </a:r>
             <a:endParaRPr kumimoji="1" lang="en-US" altLang="ko-KR" sz="3200" dirty="0"/>
-          </a:p>
-        </p:txBody>
-      </p:sp>
-      <p:sp>
-        <p:nvSpPr>
-          <p:cNvPr id="4" name="TextBox 3">
-            <a:extLst>
-              <a:ext uri="{FF2B5EF4-FFF2-40B4-BE49-F238E27FC236}">
-                <a16:creationId xmlns:a16="http://schemas.microsoft.com/office/drawing/2014/main" id="{1425BE48-1769-1844-917D-8216C846A122}"/>
-              </a:ext>
-            </a:extLst>
-          </p:cNvPr>
-          <p:cNvSpPr txBox="1"/>
-          <p:nvPr/>
-        </p:nvSpPr>
-        <p:spPr>
-          <a:xfrm>
-            <a:off x="468351" y="1386988"/>
-            <a:ext cx="5307981" cy="461665"/>
-          </a:xfrm>
-          <a:prstGeom prst="rect">
-            <a:avLst/>
-          </a:prstGeom>
-          <a:noFill/>
-        </p:spPr>
-        <p:txBody>
-          <a:bodyPr wrap="square" rtlCol="0">
-            <a:spAutoFit/>
-          </a:bodyPr>
-          <a:lstStyle/>
-          <a:p>
-            <a:r>
-              <a:rPr kumimoji="1" lang="en-US" altLang="ko-KR" sz="2400" b="1" dirty="0">
-                <a:solidFill>
-                  <a:schemeClr val="accent1">
-                    <a:lumMod val="75000"/>
-                  </a:schemeClr>
-                </a:solidFill>
-              </a:rPr>
-              <a:t>Commit Message Guide</a:t>
-            </a:r>
-          </a:p>
-        </p:txBody>
-      </p:sp>
-      <p:sp>
-        <p:nvSpPr>
-          <p:cNvPr id="5" name="TextBox 4">
-            <a:extLst>
-              <a:ext uri="{FF2B5EF4-FFF2-40B4-BE49-F238E27FC236}">
-                <a16:creationId xmlns:a16="http://schemas.microsoft.com/office/drawing/2014/main" id="{5FE4E980-C894-5E44-BC67-B4CEFF65FBB1}"/>
-              </a:ext>
-            </a:extLst>
-          </p:cNvPr>
-          <p:cNvSpPr txBox="1"/>
-          <p:nvPr/>
-        </p:nvSpPr>
-        <p:spPr>
-          <a:xfrm>
-            <a:off x="468351" y="2124309"/>
-            <a:ext cx="11273883" cy="461665"/>
-          </a:xfrm>
-          <a:prstGeom prst="rect">
-            <a:avLst/>
-          </a:prstGeom>
-          <a:noFill/>
-        </p:spPr>
-        <p:txBody>
-          <a:bodyPr wrap="square" rtlCol="0">
-            <a:spAutoFit/>
-          </a:bodyPr>
-          <a:lstStyle/>
-          <a:p>
-            <a:r>
-              <a:rPr kumimoji="1" lang="en-US" altLang="ko-KR" sz="2400" dirty="0"/>
-              <a:t>[Updated] – </a:t>
-            </a:r>
-            <a:r>
-              <a:rPr kumimoji="1" lang="ko-KR" altLang="en-US" sz="2400" dirty="0"/>
-              <a:t>파일이나 기능이 수정되었을 경우</a:t>
-            </a:r>
-            <a:endParaRPr kumimoji="1" lang="en-US" altLang="ko-KR" sz="2400" dirty="0"/>
-          </a:p>
-        </p:txBody>
-      </p:sp>
-      <p:sp>
-        <p:nvSpPr>
-          <p:cNvPr id="6" name="TextBox 5">
-            <a:extLst>
-              <a:ext uri="{FF2B5EF4-FFF2-40B4-BE49-F238E27FC236}">
-                <a16:creationId xmlns:a16="http://schemas.microsoft.com/office/drawing/2014/main" id="{4FD67551-D4B2-4945-8A13-ED17E7AC36C4}"/>
-              </a:ext>
-            </a:extLst>
-          </p:cNvPr>
-          <p:cNvSpPr txBox="1"/>
-          <p:nvPr/>
-        </p:nvSpPr>
-        <p:spPr>
-          <a:xfrm>
-            <a:off x="468351" y="2861630"/>
-            <a:ext cx="11273883" cy="461665"/>
-          </a:xfrm>
-          <a:prstGeom prst="rect">
-            <a:avLst/>
-          </a:prstGeom>
-          <a:noFill/>
-        </p:spPr>
-        <p:txBody>
-          <a:bodyPr wrap="square" rtlCol="0">
-            <a:spAutoFit/>
-          </a:bodyPr>
-          <a:lstStyle/>
-          <a:p>
-            <a:r>
-              <a:rPr kumimoji="1" lang="en-US" altLang="ko-KR" sz="2400" dirty="0"/>
-              <a:t>[Add] – </a:t>
-            </a:r>
-            <a:r>
-              <a:rPr kumimoji="1" lang="ko-KR" altLang="en-US" sz="2400" dirty="0"/>
-              <a:t>파일이나 기능이 추가되었을 경우</a:t>
-            </a:r>
-            <a:endParaRPr kumimoji="1" lang="en-US" altLang="ko-KR" sz="2400" dirty="0"/>
-          </a:p>
-        </p:txBody>
-      </p:sp>
-      <p:sp>
-        <p:nvSpPr>
-          <p:cNvPr id="7" name="TextBox 6">
-            <a:extLst>
-              <a:ext uri="{FF2B5EF4-FFF2-40B4-BE49-F238E27FC236}">
-                <a16:creationId xmlns:a16="http://schemas.microsoft.com/office/drawing/2014/main" id="{57A1A272-B509-7843-9C15-74C0B239B637}"/>
-              </a:ext>
-            </a:extLst>
-          </p:cNvPr>
-          <p:cNvSpPr txBox="1"/>
-          <p:nvPr/>
-        </p:nvSpPr>
-        <p:spPr>
-          <a:xfrm>
-            <a:off x="459058" y="3598951"/>
-            <a:ext cx="11273883" cy="461665"/>
-          </a:xfrm>
-          <a:prstGeom prst="rect">
-            <a:avLst/>
-          </a:prstGeom>
-          <a:noFill/>
-        </p:spPr>
-        <p:txBody>
-          <a:bodyPr wrap="square" rtlCol="0">
-            <a:spAutoFit/>
-          </a:bodyPr>
-          <a:lstStyle/>
-          <a:p>
-            <a:r>
-              <a:rPr kumimoji="1" lang="en-US" altLang="ko-KR" sz="2400" dirty="0"/>
-              <a:t>[Fixed] – </a:t>
-            </a:r>
-            <a:r>
-              <a:rPr kumimoji="1" lang="ko-KR" altLang="en-US" sz="2400" dirty="0"/>
-              <a:t>버그를 수정할 경우</a:t>
-            </a:r>
-            <a:endParaRPr kumimoji="1" lang="en-US" altLang="ko-KR" sz="2400" dirty="0"/>
-          </a:p>
-        </p:txBody>
-      </p:sp>
-      <p:sp>
-        <p:nvSpPr>
-          <p:cNvPr id="8" name="TextBox 7">
-            <a:extLst>
-              <a:ext uri="{FF2B5EF4-FFF2-40B4-BE49-F238E27FC236}">
-                <a16:creationId xmlns:a16="http://schemas.microsoft.com/office/drawing/2014/main" id="{5D05DC2E-C9BA-2348-BC1B-885E36B4A8F6}"/>
-              </a:ext>
-            </a:extLst>
-          </p:cNvPr>
-          <p:cNvSpPr txBox="1"/>
-          <p:nvPr/>
-        </p:nvSpPr>
-        <p:spPr>
-          <a:xfrm>
-            <a:off x="459057" y="4405629"/>
-            <a:ext cx="11273883" cy="461665"/>
-          </a:xfrm>
-          <a:prstGeom prst="rect">
-            <a:avLst/>
-          </a:prstGeom>
-          <a:noFill/>
-        </p:spPr>
-        <p:txBody>
-          <a:bodyPr wrap="square" rtlCol="0">
-            <a:spAutoFit/>
-          </a:bodyPr>
-          <a:lstStyle/>
-          <a:p>
-            <a:r>
-              <a:rPr kumimoji="1" lang="en-US" altLang="ko-KR" sz="2400" b="1" dirty="0">
-                <a:solidFill>
-                  <a:schemeClr val="accent1">
-                    <a:lumMod val="75000"/>
-                  </a:schemeClr>
-                </a:solidFill>
-              </a:rPr>
-              <a:t>Etc..</a:t>
-            </a:r>
-          </a:p>
-        </p:txBody>
-      </p:sp>
-      <p:sp>
-        <p:nvSpPr>
-          <p:cNvPr id="9" name="TextBox 8">
-            <a:extLst>
-              <a:ext uri="{FF2B5EF4-FFF2-40B4-BE49-F238E27FC236}">
-                <a16:creationId xmlns:a16="http://schemas.microsoft.com/office/drawing/2014/main" id="{871C6028-CB96-3340-A5AB-8E5A3EC0E937}"/>
-              </a:ext>
-            </a:extLst>
-          </p:cNvPr>
-          <p:cNvSpPr txBox="1"/>
-          <p:nvPr/>
-        </p:nvSpPr>
-        <p:spPr>
-          <a:xfrm>
-            <a:off x="468351" y="5142950"/>
-            <a:ext cx="11273883" cy="830997"/>
-          </a:xfrm>
-          <a:prstGeom prst="rect">
-            <a:avLst/>
-          </a:prstGeom>
-          <a:noFill/>
-        </p:spPr>
-        <p:txBody>
-          <a:bodyPr wrap="square" rtlCol="0">
-            <a:spAutoFit/>
-          </a:bodyPr>
-          <a:lstStyle/>
-          <a:p>
-            <a:r>
-              <a:rPr kumimoji="1" lang="ko-KR" altLang="en-US" sz="2400" dirty="0"/>
-              <a:t>특정 이슈와 관련된 </a:t>
-            </a:r>
-            <a:r>
-              <a:rPr kumimoji="1" lang="ko-KR" altLang="en-US" sz="2400" dirty="0" err="1"/>
-              <a:t>커밋</a:t>
-            </a:r>
-            <a:r>
-              <a:rPr kumimoji="1" lang="ko-KR" altLang="en-US" sz="2400" dirty="0"/>
-              <a:t> </a:t>
-            </a:r>
-            <a:r>
-              <a:rPr kumimoji="1" lang="en-US" altLang="ko-KR" sz="2400" dirty="0"/>
-              <a:t>(#</a:t>
-            </a:r>
-            <a:r>
-              <a:rPr kumimoji="1" lang="ko-KR" altLang="en-US" sz="2400" dirty="0" err="1"/>
-              <a:t>이슈번호</a:t>
-            </a:r>
-            <a:r>
-              <a:rPr kumimoji="1" lang="en-US" altLang="ko-KR" sz="2400" dirty="0"/>
-              <a:t>)</a:t>
-            </a:r>
-          </a:p>
-          <a:p>
-            <a:r>
-              <a:rPr kumimoji="1" lang="ko-KR" altLang="en-US" sz="2400" dirty="0"/>
-              <a:t>이슈를 닫을 경우 </a:t>
-            </a:r>
-            <a:r>
-              <a:rPr kumimoji="1" lang="en-US" altLang="ko-KR" sz="2400" dirty="0"/>
-              <a:t>(closed #</a:t>
-            </a:r>
-            <a:r>
-              <a:rPr kumimoji="1" lang="ko-KR" altLang="en-US" sz="2400" dirty="0" err="1"/>
-              <a:t>이슈번호</a:t>
-            </a:r>
-            <a:r>
-              <a:rPr kumimoji="1" lang="en-US" altLang="ko-KR" sz="2400" dirty="0"/>
-              <a:t>)</a:t>
-            </a:r>
           </a:p>
         </p:txBody>
       </p:sp>
       <p:pic>
         <p:nvPicPr>
-          <p:cNvPr id="10" name="그림 9">
-            <a:extLst>
-              <a:ext uri="{FF2B5EF4-FFF2-40B4-BE49-F238E27FC236}">
-                <a16:creationId xmlns:a16="http://schemas.microsoft.com/office/drawing/2014/main" id="{D6EE10CC-C83D-6840-9EFF-556C41C151CC}"/>
+          <p:cNvPr id="4" name="그림 3">
+            <a:extLst>
+              <a:ext uri="{FF2B5EF4-FFF2-40B4-BE49-F238E27FC236}">
+                <a16:creationId xmlns:a16="http://schemas.microsoft.com/office/drawing/2014/main" id="{2D4480A9-A587-F44C-9934-6D2EBA865DD1}"/>
               </a:ext>
             </a:extLst>
           </p:cNvPr>
@@ -4527,18 +4323,147 @@
         </p:blipFill>
         <p:spPr>
           <a:xfrm>
-            <a:off x="7022477" y="718524"/>
-            <a:ext cx="5037556" cy="5760854"/>
+            <a:off x="572854" y="1306287"/>
+            <a:ext cx="4652289" cy="5269430"/>
           </a:xfrm>
           <a:prstGeom prst="rect">
             <a:avLst/>
           </a:prstGeom>
         </p:spPr>
       </p:pic>
+      <p:sp>
+        <p:nvSpPr>
+          <p:cNvPr id="5" name="TextBox 4">
+            <a:extLst>
+              <a:ext uri="{FF2B5EF4-FFF2-40B4-BE49-F238E27FC236}">
+                <a16:creationId xmlns:a16="http://schemas.microsoft.com/office/drawing/2014/main" id="{F843C63A-E92C-824F-8E1C-06786B0AC42F}"/>
+              </a:ext>
+            </a:extLst>
+          </p:cNvPr>
+          <p:cNvSpPr txBox="1"/>
+          <p:nvPr/>
+        </p:nvSpPr>
+        <p:spPr>
+          <a:xfrm>
+            <a:off x="6096000" y="1306287"/>
+            <a:ext cx="3579223" cy="369332"/>
+          </a:xfrm>
+          <a:prstGeom prst="rect">
+            <a:avLst/>
+          </a:prstGeom>
+          <a:noFill/>
+        </p:spPr>
+        <p:txBody>
+          <a:bodyPr wrap="square" rtlCol="0">
+            <a:spAutoFit/>
+          </a:bodyPr>
+          <a:lstStyle/>
+          <a:p>
+            <a:r>
+              <a:rPr kumimoji="1" lang="ko-KR" altLang="en-US" dirty="0"/>
+              <a:t>총 </a:t>
+            </a:r>
+            <a:r>
+              <a:rPr kumimoji="1" lang="en-US" altLang="ko-KR" dirty="0"/>
+              <a:t>21</a:t>
+            </a:r>
+            <a:r>
+              <a:rPr kumimoji="1" lang="ko-KR" altLang="en-US" dirty="0"/>
+              <a:t> 개 이슈</a:t>
+            </a:r>
+          </a:p>
+        </p:txBody>
+      </p:sp>
+      <p:sp>
+        <p:nvSpPr>
+          <p:cNvPr id="6" name="TextBox 5">
+            <a:extLst>
+              <a:ext uri="{FF2B5EF4-FFF2-40B4-BE49-F238E27FC236}">
+                <a16:creationId xmlns:a16="http://schemas.microsoft.com/office/drawing/2014/main" id="{F297EA4F-8FE1-594A-B7B1-2FF205EFEC3C}"/>
+              </a:ext>
+            </a:extLst>
+          </p:cNvPr>
+          <p:cNvSpPr txBox="1"/>
+          <p:nvPr/>
+        </p:nvSpPr>
+        <p:spPr>
+          <a:xfrm>
+            <a:off x="6096000" y="2007327"/>
+            <a:ext cx="3579223" cy="369332"/>
+          </a:xfrm>
+          <a:prstGeom prst="rect">
+            <a:avLst/>
+          </a:prstGeom>
+          <a:noFill/>
+        </p:spPr>
+        <p:txBody>
+          <a:bodyPr wrap="square" rtlCol="0">
+            <a:spAutoFit/>
+          </a:bodyPr>
+          <a:lstStyle/>
+          <a:p>
+            <a:r>
+              <a:rPr kumimoji="1" lang="ko-KR" altLang="en-US" dirty="0"/>
+              <a:t>처리된 이슈 </a:t>
+            </a:r>
+            <a:r>
+              <a:rPr kumimoji="1" lang="en-US" altLang="ko-KR" dirty="0"/>
+              <a:t>13</a:t>
+            </a:r>
+            <a:r>
+              <a:rPr kumimoji="1" lang="ko-KR" altLang="en-US" dirty="0"/>
+              <a:t>개</a:t>
+            </a:r>
+          </a:p>
+        </p:txBody>
+      </p:sp>
+      <p:sp>
+        <p:nvSpPr>
+          <p:cNvPr id="7" name="TextBox 6">
+            <a:extLst>
+              <a:ext uri="{FF2B5EF4-FFF2-40B4-BE49-F238E27FC236}">
+                <a16:creationId xmlns:a16="http://schemas.microsoft.com/office/drawing/2014/main" id="{41B47886-A6F5-384C-B20B-2250E53C600A}"/>
+              </a:ext>
+            </a:extLst>
+          </p:cNvPr>
+          <p:cNvSpPr txBox="1"/>
+          <p:nvPr/>
+        </p:nvSpPr>
+        <p:spPr>
+          <a:xfrm>
+            <a:off x="6096000" y="2708367"/>
+            <a:ext cx="3579223" cy="369332"/>
+          </a:xfrm>
+          <a:prstGeom prst="rect">
+            <a:avLst/>
+          </a:prstGeom>
+          <a:noFill/>
+        </p:spPr>
+        <p:txBody>
+          <a:bodyPr wrap="square" rtlCol="0">
+            <a:spAutoFit/>
+          </a:bodyPr>
+          <a:lstStyle/>
+          <a:p>
+            <a:r>
+              <a:rPr kumimoji="1" lang="ko-KR" altLang="en-US" dirty="0"/>
+              <a:t>남은 이슈 </a:t>
+            </a:r>
+            <a:r>
+              <a:rPr kumimoji="1" lang="en-US" altLang="ko-KR" dirty="0"/>
+              <a:t>8</a:t>
+            </a:r>
+            <a:r>
+              <a:rPr kumimoji="1" lang="ko-KR" altLang="en-US" dirty="0"/>
+              <a:t>개</a:t>
+            </a:r>
+          </a:p>
+        </p:txBody>
+      </p:sp>
     </p:spTree>
     <p:extLst>
       <p:ext uri="{BB962C8B-B14F-4D97-AF65-F5344CB8AC3E}">
-        <p14:creationId xmlns:p14="http://schemas.microsoft.com/office/powerpoint/2010/main" val="3514008146"/>
+        <p14:creationId xmlns:p14="http://schemas.microsoft.com/office/powerpoint/2010/main" val="686247428"/>
       </p:ext>
     </p:extLst>
   </p:cSld>
@@ -4595,48 +4520,33 @@
           <a:p>
             <a:r>
               <a:rPr kumimoji="1" lang="ko-KR" altLang="en-US" sz="3200" dirty="0"/>
-              <a:t>현재 진행상황</a:t>
-            </a:r>
-            <a:endParaRPr kumimoji="1" lang="en-US" altLang="ko-KR" sz="3200" dirty="0"/>
-          </a:p>
-        </p:txBody>
-      </p:sp>
-      <p:pic>
-        <p:nvPicPr>
-          <p:cNvPr id="4" name="그림 3">
-            <a:extLst>
-              <a:ext uri="{FF2B5EF4-FFF2-40B4-BE49-F238E27FC236}">
-                <a16:creationId xmlns:a16="http://schemas.microsoft.com/office/drawing/2014/main" id="{2D4480A9-A587-F44C-9934-6D2EBA865DD1}"/>
-              </a:ext>
-            </a:extLst>
-          </p:cNvPr>
-          <p:cNvPicPr>
-            <a:picLocks noChangeAspect="1"/>
-          </p:cNvPicPr>
-          <p:nvPr/>
-        </p:nvPicPr>
-        <p:blipFill>
-          <a:blip r:embed="rId2"/>
-          <a:stretch>
-            <a:fillRect/>
-          </a:stretch>
-        </p:blipFill>
-        <p:spPr>
-          <a:xfrm>
-            <a:off x="572854" y="1306287"/>
-            <a:ext cx="4652289" cy="5269430"/>
-          </a:xfrm>
-          <a:prstGeom prst="rect">
-            <a:avLst/>
-          </a:prstGeom>
-        </p:spPr>
-      </p:pic>
-      <p:sp>
-        <p:nvSpPr>
-          <p:cNvPr id="5" name="TextBox 4">
-            <a:extLst>
-              <a:ext uri="{FF2B5EF4-FFF2-40B4-BE49-F238E27FC236}">
-                <a16:creationId xmlns:a16="http://schemas.microsoft.com/office/drawing/2014/main" id="{F843C63A-E92C-824F-8E1C-06786B0AC42F}"/>
+              <a:t>게임 룰</a:t>
+            </a:r>
+            <a:r>
+              <a:rPr kumimoji="1" lang="en-US" altLang="ko-KR" sz="3200" dirty="0"/>
+              <a:t>(</a:t>
+            </a:r>
+            <a:r>
+              <a:rPr kumimoji="1" lang="ko-KR" altLang="en-US" sz="3200" dirty="0" err="1"/>
+              <a:t>렌주</a:t>
+            </a:r>
+            <a:r>
+              <a:rPr kumimoji="1" lang="ko-KR" altLang="en-US" sz="3200" dirty="0"/>
+              <a:t> 룰</a:t>
+            </a:r>
+            <a:r>
+              <a:rPr kumimoji="1" lang="en-US" altLang="ko-KR" sz="3200" dirty="0"/>
+              <a:t>)</a:t>
+            </a:r>
+          </a:p>
+        </p:txBody>
+      </p:sp>
+      <p:sp>
+        <p:nvSpPr>
+          <p:cNvPr id="3" name="TextBox 2">
+            <a:extLst>
+              <a:ext uri="{FF2B5EF4-FFF2-40B4-BE49-F238E27FC236}">
+                <a16:creationId xmlns:a16="http://schemas.microsoft.com/office/drawing/2014/main" id="{66EA1D7E-0736-4149-9031-797398277D4D}"/>
               </a:ext>
             </a:extLst>
           </p:cNvPr>
@@ -4645,8 +4555,8 @@
         </p:nvSpPr>
         <p:spPr>
           <a:xfrm>
-            <a:off x="6096000" y="1306287"/>
-            <a:ext cx="3579223" cy="369332"/>
+            <a:off x="468350" y="1602432"/>
+            <a:ext cx="5307981" cy="461665"/>
           </a:xfrm>
           <a:prstGeom prst="rect">
             <a:avLst/>
@@ -4660,26 +4570,30 @@
           <a:lstStyle/>
           <a:p>
             <a:r>
-              <a:rPr kumimoji="1" lang="ko-KR" altLang="en-US" dirty="0"/>
-              <a:t>총 </a:t>
-            </a:r>
-            <a:r>
-              <a:rPr kumimoji="1" lang="en-US" altLang="ko-KR" dirty="0"/>
-              <a:t>21</a:t>
-            </a:r>
-            <a:r>
-              <a:rPr kumimoji="1" lang="ko-KR" altLang="en-US" dirty="0"/>
-              <a:t> 개 이슈</a:t>
-            </a:r>
-          </a:p>
-        </p:txBody>
-      </p:sp>
-      <p:sp>
-        <p:nvSpPr>
-          <p:cNvPr id="6" name="TextBox 5">
-            <a:extLst>
-              <a:ext uri="{FF2B5EF4-FFF2-40B4-BE49-F238E27FC236}">
-                <a16:creationId xmlns:a16="http://schemas.microsoft.com/office/drawing/2014/main" id="{F297EA4F-8FE1-594A-B7B1-2FF205EFEC3C}"/>
+              <a:rPr kumimoji="1" lang="ko-KR" altLang="en-US" sz="2400" dirty="0"/>
+              <a:t>흑은 첫 수를 </a:t>
+            </a:r>
+            <a:r>
+              <a:rPr kumimoji="1" lang="ko-KR" altLang="en-US" sz="2400" b="1" dirty="0">
+                <a:solidFill>
+                  <a:srgbClr val="FF0000"/>
+                </a:solidFill>
+              </a:rPr>
+              <a:t>천원</a:t>
+            </a:r>
+            <a:r>
+              <a:rPr kumimoji="1" lang="ko-KR" altLang="en-US" sz="2400" dirty="0"/>
+              <a:t>에 둠</a:t>
+            </a:r>
+          </a:p>
+        </p:txBody>
+      </p:sp>
+      <p:sp>
+        <p:nvSpPr>
+          <p:cNvPr id="4" name="TextBox 3">
+            <a:extLst>
+              <a:ext uri="{FF2B5EF4-FFF2-40B4-BE49-F238E27FC236}">
+                <a16:creationId xmlns:a16="http://schemas.microsoft.com/office/drawing/2014/main" id="{5F4F3280-FABD-5B46-9DA0-AF10F4E4BD3A}"/>
               </a:ext>
             </a:extLst>
           </p:cNvPr>
@@ -4688,8 +4602,8 @@
         </p:nvSpPr>
         <p:spPr>
           <a:xfrm>
-            <a:off x="6096000" y="2007327"/>
-            <a:ext cx="3579223" cy="369332"/>
+            <a:off x="468350" y="2357144"/>
+            <a:ext cx="5307981" cy="461665"/>
           </a:xfrm>
           <a:prstGeom prst="rect">
             <a:avLst/>
@@ -4703,26 +4617,62 @@
           <a:lstStyle/>
           <a:p>
             <a:r>
-              <a:rPr kumimoji="1" lang="ko-KR" altLang="en-US" dirty="0"/>
-              <a:t>처리된 이슈 </a:t>
-            </a:r>
-            <a:r>
-              <a:rPr kumimoji="1" lang="en-US" altLang="ko-KR" dirty="0"/>
-              <a:t>13</a:t>
-            </a:r>
-            <a:r>
-              <a:rPr kumimoji="1" lang="ko-KR" altLang="en-US" dirty="0"/>
-              <a:t>개</a:t>
-            </a:r>
-          </a:p>
-        </p:txBody>
-      </p:sp>
-      <p:sp>
-        <p:nvSpPr>
-          <p:cNvPr id="7" name="TextBox 6">
-            <a:extLst>
-              <a:ext uri="{FF2B5EF4-FFF2-40B4-BE49-F238E27FC236}">
-                <a16:creationId xmlns:a16="http://schemas.microsoft.com/office/drawing/2014/main" id="{41B47886-A6F5-384C-B20B-2250E53C600A}"/>
+              <a:rPr kumimoji="1" lang="ko-KR" altLang="en-US" sz="2400" dirty="0"/>
+              <a:t>흑 </a:t>
+            </a:r>
+            <a:r>
+              <a:rPr kumimoji="1" lang="en-US" altLang="ko-KR" sz="2400" b="1" dirty="0">
+                <a:solidFill>
+                  <a:srgbClr val="FF0000"/>
+                </a:solidFill>
+              </a:rPr>
+              <a:t>3-3</a:t>
+            </a:r>
+            <a:r>
+              <a:rPr kumimoji="1" lang="en-US" altLang="ko-KR" sz="2400" dirty="0"/>
+              <a:t>,</a:t>
+            </a:r>
+            <a:r>
+              <a:rPr kumimoji="1" lang="ko-KR" altLang="en-US" sz="2400" dirty="0"/>
+              <a:t> </a:t>
+            </a:r>
+            <a:r>
+              <a:rPr kumimoji="1" lang="en-US" altLang="ko-KR" sz="2400" b="1" dirty="0">
+                <a:solidFill>
+                  <a:srgbClr val="FF0000"/>
+                </a:solidFill>
+              </a:rPr>
+              <a:t>4-4</a:t>
+            </a:r>
+            <a:r>
+              <a:rPr kumimoji="1" lang="en-US" altLang="ko-KR" sz="2400" dirty="0"/>
+              <a:t>,</a:t>
+            </a:r>
+            <a:r>
+              <a:rPr kumimoji="1" lang="ko-KR" altLang="en-US" sz="2400" dirty="0"/>
+              <a:t> </a:t>
+            </a:r>
+            <a:r>
+              <a:rPr kumimoji="1" lang="ko-KR" altLang="en-US" sz="2400" b="1" dirty="0" err="1">
+                <a:solidFill>
+                  <a:srgbClr val="FF0000"/>
+                </a:solidFill>
+              </a:rPr>
+              <a:t>육목</a:t>
+            </a:r>
+            <a:r>
+              <a:rPr kumimoji="1" lang="ko-KR" altLang="en-US" sz="2400" dirty="0"/>
+              <a:t> 금지</a:t>
+            </a:r>
+          </a:p>
+        </p:txBody>
+      </p:sp>
+      <p:sp>
+        <p:nvSpPr>
+          <p:cNvPr id="5" name="TextBox 4">
+            <a:extLst>
+              <a:ext uri="{FF2B5EF4-FFF2-40B4-BE49-F238E27FC236}">
+                <a16:creationId xmlns:a16="http://schemas.microsoft.com/office/drawing/2014/main" id="{61A07584-D2A0-8B4F-8ABE-491911469108}"/>
               </a:ext>
             </a:extLst>
           </p:cNvPr>
@@ -4731,8 +4681,8 @@
         </p:nvSpPr>
         <p:spPr>
           <a:xfrm>
-            <a:off x="6096000" y="2708367"/>
-            <a:ext cx="3579223" cy="369332"/>
+            <a:off x="468350" y="3148880"/>
+            <a:ext cx="5307981" cy="461665"/>
           </a:xfrm>
           <a:prstGeom prst="rect">
             <a:avLst/>
@@ -4746,24 +4696,74 @@
           <a:lstStyle/>
           <a:p>
             <a:r>
-              <a:rPr kumimoji="1" lang="ko-KR" altLang="en-US" dirty="0"/>
-              <a:t>남은 이슈 </a:t>
-            </a:r>
-            <a:r>
-              <a:rPr kumimoji="1" lang="en-US" altLang="ko-KR" dirty="0"/>
-              <a:t>8</a:t>
-            </a:r>
-            <a:r>
-              <a:rPr kumimoji="1" lang="ko-KR" altLang="en-US" dirty="0"/>
-              <a:t>개</a:t>
-            </a:r>
+              <a:rPr kumimoji="1" lang="ko-KR" altLang="en-US" sz="2400" dirty="0"/>
+              <a:t>일반적으로 </a:t>
+            </a:r>
+            <a:r>
+              <a:rPr kumimoji="1" lang="en-US" altLang="ko-KR" sz="2400" dirty="0"/>
+              <a:t>15x15 </a:t>
+            </a:r>
+            <a:r>
+              <a:rPr kumimoji="1" lang="ko-KR" altLang="en-US" sz="2400" dirty="0"/>
+              <a:t>오목판으로 사용</a:t>
+            </a:r>
+          </a:p>
+        </p:txBody>
+      </p:sp>
+      <p:sp>
+        <p:nvSpPr>
+          <p:cNvPr id="6" name="TextBox 5">
+            <a:extLst>
+              <a:ext uri="{FF2B5EF4-FFF2-40B4-BE49-F238E27FC236}">
+                <a16:creationId xmlns:a16="http://schemas.microsoft.com/office/drawing/2014/main" id="{DF1B6BBB-500B-7B49-90CF-BE720409EB87}"/>
+              </a:ext>
+            </a:extLst>
+          </p:cNvPr>
+          <p:cNvSpPr txBox="1"/>
+          <p:nvPr/>
+        </p:nvSpPr>
+        <p:spPr>
+          <a:xfrm>
+            <a:off x="468349" y="5442314"/>
+            <a:ext cx="7114480" cy="461665"/>
+          </a:xfrm>
+          <a:prstGeom prst="rect">
+            <a:avLst/>
+          </a:prstGeom>
+          <a:noFill/>
+        </p:spPr>
+        <p:txBody>
+          <a:bodyPr wrap="square" rtlCol="0">
+            <a:spAutoFit/>
+          </a:bodyPr>
+          <a:lstStyle/>
+          <a:p>
+            <a:r>
+              <a:rPr kumimoji="1" lang="en" altLang="ko-KR" sz="2400" dirty="0">
+                <a:hlinkClick r:id="rId2"/>
+              </a:rPr>
+              <a:t>https://</a:t>
+            </a:r>
+            <a:r>
+              <a:rPr kumimoji="1" lang="en" altLang="ko-KR" sz="2400" dirty="0" err="1">
+                <a:hlinkClick r:id="rId2"/>
+              </a:rPr>
+              <a:t>namu.wiki</a:t>
+            </a:r>
+            <a:r>
+              <a:rPr kumimoji="1" lang="en" altLang="ko-KR" sz="2400" dirty="0">
+                <a:hlinkClick r:id="rId2"/>
+              </a:rPr>
+              <a:t>/w/%EB%A0%8C%EC%A3%BC</a:t>
+            </a:r>
+            <a:endParaRPr kumimoji="1" lang="ko-KR" altLang="en-US" sz="2400" dirty="0"/>
           </a:p>
         </p:txBody>
       </p:sp>
     </p:spTree>
     <p:extLst>
       <p:ext uri="{BB962C8B-B14F-4D97-AF65-F5344CB8AC3E}">
-        <p14:creationId xmlns:p14="http://schemas.microsoft.com/office/powerpoint/2010/main" val="686247428"/>
+        <p14:creationId xmlns:p14="http://schemas.microsoft.com/office/powerpoint/2010/main" val="968293018"/>
       </p:ext>
     </p:extLst>
   </p:cSld>

</xml_diff>